<commit_message>
added Ultimate Bomberman slide.
</commit_message>
<xml_diff>
--- a/documents/presentation_analyse_and_datamodel/Analyse-_und_Designmodell.pptx
+++ b/documents/presentation_analyse_and_datamodel/Analyse-_und_Designmodell.pptx
@@ -6,17 +6,18 @@
   </p:sldMasterIdLst>
   <p:sldIdLst>
     <p:sldId id="256" r:id="rId2"/>
-    <p:sldId id="257" r:id="rId3"/>
-    <p:sldId id="258" r:id="rId4"/>
-    <p:sldId id="260" r:id="rId5"/>
-    <p:sldId id="261" r:id="rId6"/>
-    <p:sldId id="262" r:id="rId7"/>
-    <p:sldId id="263" r:id="rId8"/>
-    <p:sldId id="264" r:id="rId9"/>
-    <p:sldId id="265" r:id="rId10"/>
-    <p:sldId id="266" r:id="rId11"/>
-    <p:sldId id="267" r:id="rId12"/>
-    <p:sldId id="268" r:id="rId13"/>
+    <p:sldId id="269" r:id="rId3"/>
+    <p:sldId id="257" r:id="rId4"/>
+    <p:sldId id="258" r:id="rId5"/>
+    <p:sldId id="260" r:id="rId6"/>
+    <p:sldId id="261" r:id="rId7"/>
+    <p:sldId id="262" r:id="rId8"/>
+    <p:sldId id="263" r:id="rId9"/>
+    <p:sldId id="264" r:id="rId10"/>
+    <p:sldId id="265" r:id="rId11"/>
+    <p:sldId id="266" r:id="rId12"/>
+    <p:sldId id="267" r:id="rId13"/>
+    <p:sldId id="268" r:id="rId14"/>
   </p:sldIdLst>
   <p:sldSz cx="9144000" cy="6858000" type="screen4x3"/>
   <p:notesSz cx="6858000" cy="9144000"/>
@@ -2973,7 +2974,7 @@
           <a:p>
             <a:fld id="{6BFECD78-3C8E-49F2-8FAB-59489D168ABB}" type="datetimeFigureOut">
               <a:rPr lang="en-US" smtClean="0"/>
-              <a:t>01.06.13</a:t>
+              <a:t>05.06.13</a:t>
             </a:fld>
             <a:endParaRPr lang="en-US"/>
           </a:p>
@@ -3143,7 +3144,7 @@
           <a:p>
             <a:fld id="{6BFECD78-3C8E-49F2-8FAB-59489D168ABB}" type="datetimeFigureOut">
               <a:rPr lang="en-US" smtClean="0"/>
-              <a:t>01.06.13</a:t>
+              <a:t>05.06.13</a:t>
             </a:fld>
             <a:endParaRPr lang="en-US"/>
           </a:p>
@@ -3323,7 +3324,7 @@
           <a:p>
             <a:fld id="{6BFECD78-3C8E-49F2-8FAB-59489D168ABB}" type="datetimeFigureOut">
               <a:rPr lang="en-US" smtClean="0"/>
-              <a:t>01.06.13</a:t>
+              <a:t>05.06.13</a:t>
             </a:fld>
             <a:endParaRPr lang="en-US"/>
           </a:p>
@@ -3493,7 +3494,7 @@
           <a:p>
             <a:fld id="{6BFECD78-3C8E-49F2-8FAB-59489D168ABB}" type="datetimeFigureOut">
               <a:rPr lang="en-US" smtClean="0"/>
-              <a:t>01.06.13</a:t>
+              <a:t>05.06.13</a:t>
             </a:fld>
             <a:endParaRPr lang="en-US"/>
           </a:p>
@@ -3739,7 +3740,7 @@
           <a:p>
             <a:fld id="{6BFECD78-3C8E-49F2-8FAB-59489D168ABB}" type="datetimeFigureOut">
               <a:rPr lang="en-US" smtClean="0"/>
-              <a:t>01.06.13</a:t>
+              <a:t>05.06.13</a:t>
             </a:fld>
             <a:endParaRPr lang="en-US"/>
           </a:p>
@@ -4027,7 +4028,7 @@
           <a:p>
             <a:fld id="{6BFECD78-3C8E-49F2-8FAB-59489D168ABB}" type="datetimeFigureOut">
               <a:rPr lang="en-US" smtClean="0"/>
-              <a:t>01.06.13</a:t>
+              <a:t>05.06.13</a:t>
             </a:fld>
             <a:endParaRPr lang="en-US"/>
           </a:p>
@@ -4449,7 +4450,7 @@
           <a:p>
             <a:fld id="{6BFECD78-3C8E-49F2-8FAB-59489D168ABB}" type="datetimeFigureOut">
               <a:rPr lang="en-US" smtClean="0"/>
-              <a:t>01.06.13</a:t>
+              <a:t>05.06.13</a:t>
             </a:fld>
             <a:endParaRPr lang="en-US"/>
           </a:p>
@@ -4567,7 +4568,7 @@
           <a:p>
             <a:fld id="{6BFECD78-3C8E-49F2-8FAB-59489D168ABB}" type="datetimeFigureOut">
               <a:rPr lang="en-US" smtClean="0"/>
-              <a:t>01.06.13</a:t>
+              <a:t>05.06.13</a:t>
             </a:fld>
             <a:endParaRPr lang="en-US"/>
           </a:p>
@@ -4662,7 +4663,7 @@
           <a:p>
             <a:fld id="{6BFECD78-3C8E-49F2-8FAB-59489D168ABB}" type="datetimeFigureOut">
               <a:rPr lang="en-US" smtClean="0"/>
-              <a:t>01.06.13</a:t>
+              <a:t>05.06.13</a:t>
             </a:fld>
             <a:endParaRPr lang="en-US"/>
           </a:p>
@@ -4939,7 +4940,7 @@
           <a:p>
             <a:fld id="{6BFECD78-3C8E-49F2-8FAB-59489D168ABB}" type="datetimeFigureOut">
               <a:rPr lang="en-US" smtClean="0"/>
-              <a:t>01.06.13</a:t>
+              <a:t>05.06.13</a:t>
             </a:fld>
             <a:endParaRPr lang="en-US"/>
           </a:p>
@@ -5196,7 +5197,7 @@
           <a:p>
             <a:fld id="{6BFECD78-3C8E-49F2-8FAB-59489D168ABB}" type="datetimeFigureOut">
               <a:rPr lang="en-US" smtClean="0"/>
-              <a:t>01.06.13</a:t>
+              <a:t>05.06.13</a:t>
             </a:fld>
             <a:endParaRPr lang="en-US"/>
           </a:p>
@@ -5409,7 +5410,7 @@
           <a:p>
             <a:fld id="{6BFECD78-3C8E-49F2-8FAB-59489D168ABB}" type="datetimeFigureOut">
               <a:rPr lang="en-US" smtClean="0"/>
-              <a:t>01.06.13</a:t>
+              <a:t>05.06.13</a:t>
             </a:fld>
             <a:endParaRPr lang="en-US"/>
           </a:p>
@@ -5824,8 +5825,14 @@
           <a:p>
             <a:r>
               <a:rPr lang="de-DE" dirty="0" smtClean="0"/>
-              <a:t>Gruppe 1</a:t>
-            </a:r>
+              <a:t>Gruppe </a:t>
+            </a:r>
+            <a:r>
+              <a:rPr lang="de-DE" dirty="0" smtClean="0"/>
+              <a:t>1</a:t>
+            </a:r>
+          </a:p>
+          <a:p>
             <a:endParaRPr lang="de-DE" dirty="0"/>
           </a:p>
         </p:txBody>
@@ -5840,6 +5847,13 @@
   <p:clrMapOvr>
     <a:masterClrMapping/>
   </p:clrMapOvr>
+  <p:timing>
+    <p:tnLst>
+      <p:par>
+        <p:cTn xmlns:p14="http://schemas.microsoft.com/office/powerpoint/2010/main" id="1" dur="indefinite" restart="never" nodeType="tmRoot"/>
+      </p:par>
+    </p:tnLst>
+  </p:timing>
 </p:sld>
 </file>
 
@@ -5877,6 +5891,88 @@
           <a:p>
             <a:r>
               <a:rPr lang="de-DE" dirty="0" smtClean="0"/>
+              <a:t>Ausgabe aktualisieren</a:t>
+            </a:r>
+            <a:endParaRPr lang="de-DE" dirty="0"/>
+          </a:p>
+        </p:txBody>
+      </p:sp>
+      <p:sp>
+        <p:nvSpPr>
+          <p:cNvPr id="3" name="Inhaltsplatzhalter 2"/>
+          <p:cNvSpPr>
+            <a:spLocks noGrp="1"/>
+          </p:cNvSpPr>
+          <p:nvPr>
+            <p:ph idx="1"/>
+          </p:nvPr>
+        </p:nvSpPr>
+        <p:spPr/>
+        <p:txBody>
+          <a:bodyPr/>
+          <a:lstStyle/>
+          <a:p>
+            <a:r>
+              <a:rPr lang="de-DE" dirty="0" smtClean="0"/>
+              <a:t>Veränderte Objekte neu zeichnen</a:t>
+            </a:r>
+          </a:p>
+          <a:p>
+            <a:r>
+              <a:rPr lang="de-DE" dirty="0" smtClean="0"/>
+              <a:t>Töne abspielen</a:t>
+            </a:r>
+            <a:endParaRPr lang="de-DE" dirty="0"/>
+          </a:p>
+        </p:txBody>
+      </p:sp>
+    </p:spTree>
+    <p:extLst>
+      <p:ext uri="{BB962C8B-B14F-4D97-AF65-F5344CB8AC3E}">
+        <p14:creationId xmlns:p14="http://schemas.microsoft.com/office/powerpoint/2010/main" val="1593483090"/>
+      </p:ext>
+    </p:extLst>
+  </p:cSld>
+  <p:clrMapOvr>
+    <a:masterClrMapping/>
+  </p:clrMapOvr>
+</p:sld>
+</file>
+
+<file path=ppt/slides/slide11.xml><?xml version="1.0" encoding="utf-8"?>
+<p:sld xmlns:a="http://schemas.openxmlformats.org/drawingml/2006/main" xmlns:r="http://schemas.openxmlformats.org/officeDocument/2006/relationships" xmlns:p="http://schemas.openxmlformats.org/presentationml/2006/main">
+  <p:cSld>
+    <p:spTree>
+      <p:nvGrpSpPr>
+        <p:cNvPr id="1" name=""/>
+        <p:cNvGrpSpPr/>
+        <p:nvPr/>
+      </p:nvGrpSpPr>
+      <p:grpSpPr>
+        <a:xfrm>
+          <a:off x="0" y="0"/>
+          <a:ext cx="0" cy="0"/>
+          <a:chOff x="0" y="0"/>
+          <a:chExt cx="0" cy="0"/>
+        </a:xfrm>
+      </p:grpSpPr>
+      <p:sp>
+        <p:nvSpPr>
+          <p:cNvPr id="2" name="Titel 1"/>
+          <p:cNvSpPr>
+            <a:spLocks noGrp="1"/>
+          </p:cNvSpPr>
+          <p:nvPr>
+            <p:ph type="title"/>
+          </p:nvPr>
+        </p:nvSpPr>
+        <p:spPr/>
+        <p:txBody>
+          <a:bodyPr/>
+          <a:lstStyle/>
+          <a:p>
+            <a:r>
+              <a:rPr lang="de-DE" dirty="0" smtClean="0"/>
               <a:t>Arbeitsweise</a:t>
             </a:r>
             <a:endParaRPr lang="de-DE" dirty="0"/>
@@ -6009,7 +6105,7 @@
 </p:sld>
 </file>
 
-<file path=ppt/slides/slide11.xml><?xml version="1.0" encoding="utf-8"?>
+<file path=ppt/slides/slide12.xml><?xml version="1.0" encoding="utf-8"?>
 <p:sld xmlns:a="http://schemas.openxmlformats.org/drawingml/2006/main" xmlns:r="http://schemas.openxmlformats.org/officeDocument/2006/relationships" xmlns:p="http://schemas.openxmlformats.org/presentationml/2006/main">
   <p:cSld>
     <p:spTree>
@@ -6091,7 +6187,7 @@
 </p:sld>
 </file>
 
-<file path=ppt/slides/slide12.xml><?xml version="1.0" encoding="utf-8"?>
+<file path=ppt/slides/slide13.xml><?xml version="1.0" encoding="utf-8"?>
 <p:sld xmlns:a="http://schemas.openxmlformats.org/drawingml/2006/main" xmlns:r="http://schemas.openxmlformats.org/officeDocument/2006/relationships" xmlns:p="http://schemas.openxmlformats.org/presentationml/2006/main">
   <p:cSld>
     <p:spTree>
@@ -6221,7 +6317,7 @@
             <a:spLocks noGrp="1"/>
           </p:cNvSpPr>
           <p:nvPr>
-            <p:ph type="title"/>
+            <p:ph type="ctrTitle"/>
           </p:nvPr>
         </p:nvSpPr>
         <p:spPr/>
@@ -6231,7 +6327,15 @@
           <a:p>
             <a:r>
               <a:rPr lang="de-DE" dirty="0" smtClean="0"/>
-              <a:t>Team	</a:t>
+              <a:t>Ultimate </a:t>
+            </a:r>
+            <a:r>
+              <a:rPr lang="de-DE" dirty="0" err="1" smtClean="0"/>
+              <a:t>Bomberman</a:t>
+            </a:r>
+            <a:r>
+              <a:rPr lang="de-DE" dirty="0" smtClean="0"/>
+              <a:t>™</a:t>
             </a:r>
             <a:endParaRPr lang="de-DE" dirty="0"/>
           </a:p>
@@ -6239,12 +6343,12 @@
       </p:sp>
       <p:sp>
         <p:nvSpPr>
-          <p:cNvPr id="3" name="Inhaltsplatzhalter 2"/>
-          <p:cNvSpPr>
-            <a:spLocks noGrp="1"/>
-          </p:cNvSpPr>
-          <p:nvPr>
-            <p:ph idx="1"/>
+          <p:cNvPr id="3" name="Untertitel 2"/>
+          <p:cNvSpPr>
+            <a:spLocks noGrp="1"/>
+          </p:cNvSpPr>
+          <p:nvPr>
+            <p:ph type="subTitle" idx="1"/>
           </p:nvPr>
         </p:nvSpPr>
         <p:spPr/>
@@ -6254,41 +6358,34 @@
           <a:p>
             <a:r>
               <a:rPr lang="de-DE" dirty="0" smtClean="0"/>
-              <a:t>Markus Hofbauer</a:t>
-            </a:r>
-          </a:p>
-          <a:p>
+              <a:t>© 2013</a:t>
+            </a:r>
+            <a:r>
+              <a:rPr lang="de-DE" smtClean="0"/>
+              <a:t>, Team 1</a:t>
+            </a:r>
             <a:r>
               <a:rPr lang="de-DE" dirty="0" smtClean="0"/>
-              <a:t>Kevin Meyer</a:t>
-            </a:r>
-          </a:p>
-          <a:p>
+              <a:t>, All </a:t>
+            </a:r>
+            <a:r>
+              <a:rPr lang="de-DE" dirty="0" err="1" smtClean="0"/>
+              <a:t>Rights</a:t>
+            </a:r>
             <a:r>
               <a:rPr lang="de-DE" dirty="0" smtClean="0"/>
-              <a:t>Benedikt Schmidt</a:t>
-            </a:r>
-          </a:p>
-          <a:p>
+              <a:t> </a:t>
+            </a:r>
+            <a:r>
+              <a:rPr lang="de-DE" dirty="0" err="1" smtClean="0"/>
+              <a:t>reserved</a:t>
+            </a:r>
             <a:r>
               <a:rPr lang="de-DE" dirty="0" smtClean="0"/>
-              <a:t>Tommy </a:t>
-            </a:r>
-            <a:r>
-              <a:rPr lang="de-DE" dirty="0" err="1" smtClean="0"/>
-              <a:t>Shau</a:t>
-            </a:r>
-            <a:endParaRPr lang="de-DE" dirty="0" smtClean="0"/>
-          </a:p>
-          <a:p>
-            <a:r>
-              <a:rPr lang="de-DE" dirty="0" smtClean="0"/>
-              <a:t>Florian </a:t>
-            </a:r>
-            <a:r>
-              <a:rPr lang="de-DE" dirty="0" err="1" smtClean="0"/>
-              <a:t>Wirnshofer</a:t>
-            </a:r>
+              <a:t>.</a:t>
+            </a:r>
+          </a:p>
+          <a:p>
             <a:endParaRPr lang="de-DE" dirty="0"/>
           </a:p>
         </p:txBody>
@@ -6296,13 +6393,20 @@
     </p:spTree>
     <p:extLst>
       <p:ext uri="{BB962C8B-B14F-4D97-AF65-F5344CB8AC3E}">
-        <p14:creationId xmlns:p14="http://schemas.microsoft.com/office/powerpoint/2010/main" val="2263662262"/>
+        <p14:creationId xmlns:p14="http://schemas.microsoft.com/office/powerpoint/2010/main" val="4284438927"/>
       </p:ext>
     </p:extLst>
   </p:cSld>
   <p:clrMapOvr>
     <a:masterClrMapping/>
   </p:clrMapOvr>
+  <p:timing>
+    <p:tnLst>
+      <p:par>
+        <p:cTn xmlns:p14="http://schemas.microsoft.com/office/powerpoint/2010/main" id="1" dur="indefinite" restart="never" nodeType="tmRoot"/>
+      </p:par>
+    </p:tnLst>
+  </p:timing>
 </p:sld>
 </file>
 
@@ -6340,7 +6444,7 @@
           <a:p>
             <a:r>
               <a:rPr lang="de-DE" dirty="0" smtClean="0"/>
-              <a:t>Anforderungen</a:t>
+              <a:t>Team	</a:t>
             </a:r>
             <a:endParaRPr lang="de-DE" dirty="0"/>
           </a:p>
@@ -6356,82 +6460,47 @@
             <p:ph idx="1"/>
           </p:nvPr>
         </p:nvSpPr>
-        <p:spPr>
-          <a:xfrm>
-            <a:off x="457200" y="1600200"/>
-            <a:ext cx="8229600" cy="4749322"/>
-          </a:xfrm>
-        </p:spPr>
-        <p:txBody>
-          <a:bodyPr>
-            <a:normAutofit fontScale="92500" lnSpcReduction="10000"/>
-          </a:bodyPr>
+        <p:spPr/>
+        <p:txBody>
+          <a:bodyPr/>
           <a:lstStyle/>
           <a:p>
             <a:r>
               <a:rPr lang="de-DE" dirty="0" smtClean="0"/>
-              <a:t>Gerastertes Spielfeld</a:t>
+              <a:t>Markus Hofbauer</a:t>
             </a:r>
           </a:p>
           <a:p>
             <a:r>
               <a:rPr lang="de-DE" dirty="0" smtClean="0"/>
-              <a:t>Ausgabe</a:t>
+              <a:t>Kevin Meyer</a:t>
             </a:r>
           </a:p>
           <a:p>
             <a:r>
               <a:rPr lang="de-DE" dirty="0" smtClean="0"/>
-              <a:t>Spielerbewegung</a:t>
+              <a:t>Benedikt Schmidt</a:t>
             </a:r>
           </a:p>
           <a:p>
             <a:r>
               <a:rPr lang="de-DE" dirty="0" smtClean="0"/>
-              <a:t>Zerstörbare und unzerstörbare Blöcke</a:t>
-            </a:r>
+              <a:t>Tommy </a:t>
+            </a:r>
+            <a:r>
+              <a:rPr lang="de-DE" dirty="0" err="1" smtClean="0"/>
+              <a:t>Shau</a:t>
+            </a:r>
+            <a:endParaRPr lang="de-DE" dirty="0" smtClean="0"/>
           </a:p>
           <a:p>
             <a:r>
               <a:rPr lang="de-DE" dirty="0" smtClean="0"/>
-              <a:t>Bombenplatzierung</a:t>
-            </a:r>
-          </a:p>
-          <a:p>
-            <a:r>
-              <a:rPr lang="de-DE" dirty="0" smtClean="0"/>
-              <a:t>Explosion von Bomben</a:t>
-            </a:r>
-          </a:p>
-          <a:p>
-            <a:r>
-              <a:rPr lang="de-DE" dirty="0" smtClean="0"/>
-              <a:t>Power-</a:t>
+              <a:t>Florian </a:t>
             </a:r>
             <a:r>
               <a:rPr lang="de-DE" dirty="0" err="1" smtClean="0"/>
-              <a:t>ups</a:t>
-            </a:r>
-            <a:endParaRPr lang="de-DE" dirty="0" smtClean="0"/>
-          </a:p>
-          <a:p>
-            <a:r>
-              <a:rPr lang="de-DE" dirty="0" smtClean="0"/>
-              <a:t>Auswahl aus zwei </a:t>
-            </a:r>
-            <a:r>
-              <a:rPr lang="de-DE" dirty="0" smtClean="0"/>
-              <a:t>Level</a:t>
-            </a:r>
-          </a:p>
-          <a:p>
-            <a:r>
-              <a:rPr lang="de-DE" dirty="0"/>
-              <a:t>Intelligente </a:t>
-            </a:r>
-            <a:r>
-              <a:rPr lang="de-DE" dirty="0" smtClean="0"/>
-              <a:t>Gegner</a:t>
+              <a:t>Wirnshofer</a:t>
             </a:r>
             <a:endParaRPr lang="de-DE" dirty="0"/>
           </a:p>
@@ -6440,13 +6509,20 @@
     </p:spTree>
     <p:extLst>
       <p:ext uri="{BB962C8B-B14F-4D97-AF65-F5344CB8AC3E}">
-        <p14:creationId xmlns:p14="http://schemas.microsoft.com/office/powerpoint/2010/main" val="4191813478"/>
+        <p14:creationId xmlns:p14="http://schemas.microsoft.com/office/powerpoint/2010/main" val="2263662262"/>
       </p:ext>
     </p:extLst>
   </p:cSld>
   <p:clrMapOvr>
     <a:masterClrMapping/>
   </p:clrMapOvr>
+  <p:timing>
+    <p:tnLst>
+      <p:par>
+        <p:cTn xmlns:p14="http://schemas.microsoft.com/office/powerpoint/2010/main" id="1" dur="indefinite" restart="never" nodeType="tmRoot"/>
+      </p:par>
+    </p:tnLst>
+  </p:timing>
 </p:sld>
 </file>
 
@@ -6484,7 +6560,7 @@
           <a:p>
             <a:r>
               <a:rPr lang="de-DE" dirty="0" smtClean="0"/>
-              <a:t>Optionale Anforderungen</a:t>
+              <a:t>Anforderungen</a:t>
             </a:r>
             <a:endParaRPr lang="de-DE" dirty="0"/>
           </a:p>
@@ -6500,20 +6576,78 @@
             <p:ph idx="1"/>
           </p:nvPr>
         </p:nvSpPr>
-        <p:spPr/>
-        <p:txBody>
-          <a:bodyPr/>
+        <p:spPr>
+          <a:xfrm>
+            <a:off x="457200" y="1600200"/>
+            <a:ext cx="8229600" cy="4749322"/>
+          </a:xfrm>
+        </p:spPr>
+        <p:txBody>
+          <a:bodyPr>
+            <a:normAutofit fontScale="92500" lnSpcReduction="10000"/>
+          </a:bodyPr>
           <a:lstStyle/>
           <a:p>
             <a:r>
               <a:rPr lang="de-DE" dirty="0" smtClean="0"/>
-              <a:t>Soundausgabe</a:t>
+              <a:t>Gerastertes Spielfeld</a:t>
             </a:r>
           </a:p>
           <a:p>
             <a:r>
               <a:rPr lang="de-DE" dirty="0" smtClean="0"/>
-              <a:t>Multiplayer</a:t>
+              <a:t>Ausgabe</a:t>
+            </a:r>
+          </a:p>
+          <a:p>
+            <a:r>
+              <a:rPr lang="de-DE" dirty="0" smtClean="0"/>
+              <a:t>Spielerbewegung</a:t>
+            </a:r>
+          </a:p>
+          <a:p>
+            <a:r>
+              <a:rPr lang="de-DE" dirty="0" smtClean="0"/>
+              <a:t>Zerstörbare und unzerstörbare Blöcke</a:t>
+            </a:r>
+          </a:p>
+          <a:p>
+            <a:r>
+              <a:rPr lang="de-DE" dirty="0" smtClean="0"/>
+              <a:t>Bombenplatzierung</a:t>
+            </a:r>
+          </a:p>
+          <a:p>
+            <a:r>
+              <a:rPr lang="de-DE" dirty="0" smtClean="0"/>
+              <a:t>Explosion von Bomben</a:t>
+            </a:r>
+          </a:p>
+          <a:p>
+            <a:r>
+              <a:rPr lang="de-DE" dirty="0" smtClean="0"/>
+              <a:t>Power-</a:t>
+            </a:r>
+            <a:r>
+              <a:rPr lang="de-DE" dirty="0" err="1" smtClean="0"/>
+              <a:t>ups</a:t>
+            </a:r>
+            <a:endParaRPr lang="de-DE" dirty="0" smtClean="0"/>
+          </a:p>
+          <a:p>
+            <a:r>
+              <a:rPr lang="de-DE" dirty="0" smtClean="0"/>
+              <a:t>Auswahl aus zwei Level</a:t>
+            </a:r>
+          </a:p>
+          <a:p>
+            <a:r>
+              <a:rPr lang="de-DE" dirty="0"/>
+              <a:t>Intelligente </a:t>
+            </a:r>
+            <a:r>
+              <a:rPr lang="de-DE" dirty="0" smtClean="0"/>
+              <a:t>Gegner</a:t>
             </a:r>
             <a:endParaRPr lang="de-DE" dirty="0"/>
           </a:p>
@@ -6522,7 +6656,7 @@
     </p:spTree>
     <p:extLst>
       <p:ext uri="{BB962C8B-B14F-4D97-AF65-F5344CB8AC3E}">
-        <p14:creationId xmlns:p14="http://schemas.microsoft.com/office/powerpoint/2010/main" val="1560030751"/>
+        <p14:creationId xmlns:p14="http://schemas.microsoft.com/office/powerpoint/2010/main" val="4191813478"/>
       </p:ext>
     </p:extLst>
   </p:cSld>
@@ -6573,7 +6707,7 @@
           <a:p>
             <a:r>
               <a:rPr lang="de-DE" dirty="0" smtClean="0"/>
-              <a:t>Datenmodell</a:t>
+              <a:t>Optionale Anforderungen</a:t>
             </a:r>
             <a:endParaRPr lang="de-DE" dirty="0"/>
           </a:p>
@@ -6596,46 +6730,13 @@
           <a:p>
             <a:r>
               <a:rPr lang="de-DE" dirty="0" smtClean="0"/>
-              <a:t>Eingabezustand</a:t>
+              <a:t>Soundausgabe</a:t>
             </a:r>
           </a:p>
           <a:p>
             <a:r>
               <a:rPr lang="de-DE" dirty="0" smtClean="0"/>
-              <a:t>Spielzustand</a:t>
-            </a:r>
-          </a:p>
-          <a:p>
-            <a:pPr lvl="1"/>
-            <a:r>
-              <a:rPr lang="de-DE" dirty="0" smtClean="0"/>
-              <a:t>Spielerzustand</a:t>
-            </a:r>
-          </a:p>
-          <a:p>
-            <a:pPr lvl="1"/>
-            <a:r>
-              <a:rPr lang="de-DE" dirty="0" smtClean="0"/>
-              <a:t>Wände</a:t>
-            </a:r>
-          </a:p>
-          <a:p>
-            <a:pPr lvl="1"/>
-            <a:r>
-              <a:rPr lang="de-DE" dirty="0" smtClean="0"/>
-              <a:t>Bomben ...</a:t>
-            </a:r>
-          </a:p>
-          <a:p>
-            <a:r>
-              <a:rPr lang="de-DE" dirty="0" smtClean="0"/>
-              <a:t>Level</a:t>
-            </a:r>
-          </a:p>
-          <a:p>
-            <a:r>
-              <a:rPr lang="de-DE" dirty="0" smtClean="0"/>
-              <a:t>Rasterzustand</a:t>
+              <a:t>Multiplayer</a:t>
             </a:r>
             <a:endParaRPr lang="de-DE" dirty="0"/>
           </a:p>
@@ -6644,7 +6745,7 @@
     </p:spTree>
     <p:extLst>
       <p:ext uri="{BB962C8B-B14F-4D97-AF65-F5344CB8AC3E}">
-        <p14:creationId xmlns:p14="http://schemas.microsoft.com/office/powerpoint/2010/main" val="2549760716"/>
+        <p14:creationId xmlns:p14="http://schemas.microsoft.com/office/powerpoint/2010/main" val="1560030751"/>
       </p:ext>
     </p:extLst>
   </p:cSld>
@@ -6695,41 +6796,78 @@
           <a:p>
             <a:r>
               <a:rPr lang="de-DE" dirty="0" smtClean="0"/>
-              <a:t>Ablaufmodell</a:t>
+              <a:t>Datenmodell</a:t>
             </a:r>
             <a:endParaRPr lang="de-DE" dirty="0"/>
           </a:p>
         </p:txBody>
       </p:sp>
-      <p:graphicFrame>
-        <p:nvGraphicFramePr>
-          <p:cNvPr id="4" name="Inhaltsplatzhalter 3"/>
-          <p:cNvGraphicFramePr>
-            <a:graphicFrameLocks noGrp="1"/>
-          </p:cNvGraphicFramePr>
+      <p:sp>
+        <p:nvSpPr>
+          <p:cNvPr id="3" name="Inhaltsplatzhalter 2"/>
+          <p:cNvSpPr>
+            <a:spLocks noGrp="1"/>
+          </p:cNvSpPr>
           <p:nvPr>
             <p:ph idx="1"/>
-            <p:extLst>
-              <p:ext uri="{D42A27DB-BD31-4B8C-83A1-F6EECF244321}">
-                <p14:modId xmlns:p14="http://schemas.microsoft.com/office/powerpoint/2010/main" val="1712064600"/>
-              </p:ext>
-            </p:extLst>
-          </p:nvPr>
-        </p:nvGraphicFramePr>
-        <p:xfrm>
-          <a:off x="457200" y="1600200"/>
-          <a:ext cx="8229600" cy="4525963"/>
-        </p:xfrm>
-        <a:graphic>
-          <a:graphicData uri="http://schemas.openxmlformats.org/drawingml/2006/diagram">
-            <dgm:relIds xmlns:dgm="http://schemas.openxmlformats.org/drawingml/2006/diagram" xmlns:r="http://schemas.openxmlformats.org/officeDocument/2006/relationships" r:dm="rId2" r:lo="rId3" r:qs="rId4" r:cs="rId5"/>
-          </a:graphicData>
-        </a:graphic>
-      </p:graphicFrame>
+          </p:nvPr>
+        </p:nvSpPr>
+        <p:spPr/>
+        <p:txBody>
+          <a:bodyPr/>
+          <a:lstStyle/>
+          <a:p>
+            <a:r>
+              <a:rPr lang="de-DE" dirty="0" smtClean="0"/>
+              <a:t>Eingabezustand</a:t>
+            </a:r>
+          </a:p>
+          <a:p>
+            <a:r>
+              <a:rPr lang="de-DE" dirty="0" smtClean="0"/>
+              <a:t>Spielzustand</a:t>
+            </a:r>
+          </a:p>
+          <a:p>
+            <a:pPr lvl="1"/>
+            <a:r>
+              <a:rPr lang="de-DE" dirty="0" smtClean="0"/>
+              <a:t>Spielerzustand</a:t>
+            </a:r>
+          </a:p>
+          <a:p>
+            <a:pPr lvl="1"/>
+            <a:r>
+              <a:rPr lang="de-DE" dirty="0" smtClean="0"/>
+              <a:t>Wände</a:t>
+            </a:r>
+          </a:p>
+          <a:p>
+            <a:pPr lvl="1"/>
+            <a:r>
+              <a:rPr lang="de-DE" dirty="0" smtClean="0"/>
+              <a:t>Bomben ...</a:t>
+            </a:r>
+          </a:p>
+          <a:p>
+            <a:r>
+              <a:rPr lang="de-DE" dirty="0" smtClean="0"/>
+              <a:t>Level</a:t>
+            </a:r>
+          </a:p>
+          <a:p>
+            <a:r>
+              <a:rPr lang="de-DE" dirty="0" smtClean="0"/>
+              <a:t>Rasterzustand</a:t>
+            </a:r>
+            <a:endParaRPr lang="de-DE" dirty="0"/>
+          </a:p>
+        </p:txBody>
+      </p:sp>
     </p:spTree>
     <p:extLst>
       <p:ext uri="{BB962C8B-B14F-4D97-AF65-F5344CB8AC3E}">
-        <p14:creationId xmlns:p14="http://schemas.microsoft.com/office/powerpoint/2010/main" val="28193179"/>
+        <p14:creationId xmlns:p14="http://schemas.microsoft.com/office/powerpoint/2010/main" val="2549760716"/>
       </p:ext>
     </p:extLst>
   </p:cSld>
@@ -6780,55 +6918,41 @@
           <a:p>
             <a:r>
               <a:rPr lang="de-DE" dirty="0" smtClean="0"/>
-              <a:t>Eingaben abfragen</a:t>
+              <a:t>Ablaufmodell</a:t>
             </a:r>
             <a:endParaRPr lang="de-DE" dirty="0"/>
           </a:p>
         </p:txBody>
       </p:sp>
-      <p:sp>
-        <p:nvSpPr>
-          <p:cNvPr id="3" name="Inhaltsplatzhalter 2"/>
-          <p:cNvSpPr>
-            <a:spLocks noGrp="1"/>
-          </p:cNvSpPr>
+      <p:graphicFrame>
+        <p:nvGraphicFramePr>
+          <p:cNvPr id="4" name="Inhaltsplatzhalter 3"/>
+          <p:cNvGraphicFramePr>
+            <a:graphicFrameLocks noGrp="1"/>
+          </p:cNvGraphicFramePr>
           <p:nvPr>
             <p:ph idx="1"/>
-          </p:nvPr>
-        </p:nvSpPr>
-        <p:spPr/>
-        <p:txBody>
-          <a:bodyPr/>
-          <a:lstStyle/>
-          <a:p>
-            <a:r>
-              <a:rPr lang="de-DE" dirty="0" smtClean="0"/>
-              <a:t>Key Press Events abfangen</a:t>
-            </a:r>
-          </a:p>
-          <a:p>
-            <a:r>
-              <a:rPr lang="de-DE" dirty="0" smtClean="0"/>
-              <a:t>Key Release Events abfangen</a:t>
-            </a:r>
-            <a:br>
-              <a:rPr lang="de-DE" dirty="0" smtClean="0"/>
-            </a:br>
-            <a:endParaRPr lang="de-DE" dirty="0" smtClean="0"/>
-          </a:p>
-          <a:p>
-            <a:r>
-              <a:rPr lang="de-DE" dirty="0" smtClean="0"/>
-              <a:t>Pro Spieler ein Eingabezustand</a:t>
-            </a:r>
-            <a:endParaRPr lang="de-DE" dirty="0"/>
-          </a:p>
-        </p:txBody>
-      </p:sp>
+            <p:extLst>
+              <p:ext uri="{D42A27DB-BD31-4B8C-83A1-F6EECF244321}">
+                <p14:modId xmlns:p14="http://schemas.microsoft.com/office/powerpoint/2010/main" val="1712064600"/>
+              </p:ext>
+            </p:extLst>
+          </p:nvPr>
+        </p:nvGraphicFramePr>
+        <p:xfrm>
+          <a:off x="457200" y="1600200"/>
+          <a:ext cx="8229600" cy="4525963"/>
+        </p:xfrm>
+        <a:graphic>
+          <a:graphicData uri="http://schemas.openxmlformats.org/drawingml/2006/diagram">
+            <dgm:relIds xmlns:dgm="http://schemas.openxmlformats.org/drawingml/2006/diagram" xmlns:r="http://schemas.openxmlformats.org/officeDocument/2006/relationships" r:dm="rId2" r:lo="rId3" r:qs="rId4" r:cs="rId5"/>
+          </a:graphicData>
+        </a:graphic>
+      </p:graphicFrame>
     </p:spTree>
     <p:extLst>
       <p:ext uri="{BB962C8B-B14F-4D97-AF65-F5344CB8AC3E}">
-        <p14:creationId xmlns:p14="http://schemas.microsoft.com/office/powerpoint/2010/main" val="1311266705"/>
+        <p14:creationId xmlns:p14="http://schemas.microsoft.com/office/powerpoint/2010/main" val="28193179"/>
       </p:ext>
     </p:extLst>
   </p:cSld>
@@ -6879,7 +7003,7 @@
           <a:p>
             <a:r>
               <a:rPr lang="de-DE" dirty="0" smtClean="0"/>
-              <a:t>Spielzustand verändern</a:t>
+              <a:t>Eingaben abfragen</a:t>
             </a:r>
             <a:endParaRPr lang="de-DE" dirty="0"/>
           </a:p>
@@ -6902,39 +7026,23 @@
           <a:p>
             <a:r>
               <a:rPr lang="de-DE" dirty="0" smtClean="0"/>
-              <a:t>Spielerbewegungen</a:t>
+              <a:t>Key Press Events abfangen</a:t>
             </a:r>
           </a:p>
           <a:p>
             <a:r>
               <a:rPr lang="de-DE" dirty="0" smtClean="0"/>
-              <a:t>Bombenplatzierungen</a:t>
-            </a:r>
-          </a:p>
-          <a:p>
-            <a:r>
+              <a:t>Key Release Events abfangen</a:t>
+            </a:r>
+            <a:br>
               <a:rPr lang="de-DE" dirty="0" smtClean="0"/>
-              <a:t>Bombenexplosionen</a:t>
-            </a:r>
+            </a:br>
+            <a:endParaRPr lang="de-DE" dirty="0" smtClean="0"/>
           </a:p>
           <a:p>
             <a:r>
               <a:rPr lang="de-DE" dirty="0" smtClean="0"/>
-              <a:t>Blöcke entfernen</a:t>
-            </a:r>
-          </a:p>
-          <a:p>
-            <a:r>
-              <a:rPr lang="de-DE" dirty="0" smtClean="0"/>
-              <a:t>Power-</a:t>
-            </a:r>
-            <a:r>
-              <a:rPr lang="de-DE" dirty="0" err="1" smtClean="0"/>
-              <a:t>ups</a:t>
-            </a:r>
-            <a:r>
-              <a:rPr lang="de-DE" dirty="0" smtClean="0"/>
-              <a:t> generieren bzw. aufnehmen</a:t>
+              <a:t>Pro Spieler ein Eingabezustand</a:t>
             </a:r>
             <a:endParaRPr lang="de-DE" dirty="0"/>
           </a:p>
@@ -6943,7 +7051,7 @@
     </p:spTree>
     <p:extLst>
       <p:ext uri="{BB962C8B-B14F-4D97-AF65-F5344CB8AC3E}">
-        <p14:creationId xmlns:p14="http://schemas.microsoft.com/office/powerpoint/2010/main" val="1147334303"/>
+        <p14:creationId xmlns:p14="http://schemas.microsoft.com/office/powerpoint/2010/main" val="1311266705"/>
       </p:ext>
     </p:extLst>
   </p:cSld>
@@ -6994,7 +7102,7 @@
           <a:p>
             <a:r>
               <a:rPr lang="de-DE" dirty="0" smtClean="0"/>
-              <a:t>Ausgabe aktualisieren</a:t>
+              <a:t>Spielzustand verändern</a:t>
             </a:r>
             <a:endParaRPr lang="de-DE" dirty="0"/>
           </a:p>
@@ -7017,13 +7125,39 @@
           <a:p>
             <a:r>
               <a:rPr lang="de-DE" dirty="0" smtClean="0"/>
-              <a:t>Veränderte Objekte neu zeichnen</a:t>
+              <a:t>Spielerbewegungen</a:t>
             </a:r>
           </a:p>
           <a:p>
             <a:r>
               <a:rPr lang="de-DE" dirty="0" smtClean="0"/>
-              <a:t>Töne abspielen</a:t>
+              <a:t>Bombenplatzierungen</a:t>
+            </a:r>
+          </a:p>
+          <a:p>
+            <a:r>
+              <a:rPr lang="de-DE" dirty="0" smtClean="0"/>
+              <a:t>Bombenexplosionen</a:t>
+            </a:r>
+          </a:p>
+          <a:p>
+            <a:r>
+              <a:rPr lang="de-DE" dirty="0" smtClean="0"/>
+              <a:t>Blöcke entfernen</a:t>
+            </a:r>
+          </a:p>
+          <a:p>
+            <a:r>
+              <a:rPr lang="de-DE" dirty="0" smtClean="0"/>
+              <a:t>Power-</a:t>
+            </a:r>
+            <a:r>
+              <a:rPr lang="de-DE" dirty="0" err="1" smtClean="0"/>
+              <a:t>ups</a:t>
+            </a:r>
+            <a:r>
+              <a:rPr lang="de-DE" dirty="0" smtClean="0"/>
+              <a:t> generieren bzw. aufnehmen</a:t>
             </a:r>
             <a:endParaRPr lang="de-DE" dirty="0"/>
           </a:p>
@@ -7032,13 +7166,20 @@
     </p:spTree>
     <p:extLst>
       <p:ext uri="{BB962C8B-B14F-4D97-AF65-F5344CB8AC3E}">
-        <p14:creationId xmlns:p14="http://schemas.microsoft.com/office/powerpoint/2010/main" val="1593483090"/>
+        <p14:creationId xmlns:p14="http://schemas.microsoft.com/office/powerpoint/2010/main" val="1147334303"/>
       </p:ext>
     </p:extLst>
   </p:cSld>
   <p:clrMapOvr>
     <a:masterClrMapping/>
   </p:clrMapOvr>
+  <p:timing>
+    <p:tnLst>
+      <p:par>
+        <p:cTn xmlns:p14="http://schemas.microsoft.com/office/powerpoint/2010/main" id="1" dur="indefinite" restart="never" nodeType="tmRoot"/>
+      </p:par>
+    </p:tnLst>
+  </p:timing>
 </p:sld>
 </file>
 

</xml_diff>